<commit_message>
Last commit before presentation
</commit_message>
<xml_diff>
--- a/Docs/Battery Cell parameter parsing.pptx
+++ b/Docs/Battery Cell parameter parsing.pptx
@@ -9,8 +9,13 @@
     <p:sldId id="259" r:id="rId3"/>
     <p:sldId id="260" r:id="rId4"/>
     <p:sldId id="258" r:id="rId5"/>
-    <p:sldId id="261" r:id="rId6"/>
-    <p:sldId id="262" r:id="rId7"/>
+    <p:sldId id="264" r:id="rId6"/>
+    <p:sldId id="266" r:id="rId7"/>
+    <p:sldId id="263" r:id="rId8"/>
+    <p:sldId id="267" r:id="rId9"/>
+    <p:sldId id="269" r:id="rId10"/>
+    <p:sldId id="270" r:id="rId11"/>
+    <p:sldId id="262" r:id="rId12"/>
   </p:sldIdLst>
   <p:sldSz cx="12192000" cy="6858000"/>
   <p:notesSz cx="6858000" cy="9144000"/>
@@ -122,7 +127,12 @@
         </p14:section>
         <p14:section name="Rezultati" id="{FF1401FF-2753-41CE-AF17-322F3C79327B}">
           <p14:sldIdLst>
-            <p14:sldId id="261"/>
+            <p14:sldId id="264"/>
+            <p14:sldId id="266"/>
+            <p14:sldId id="263"/>
+            <p14:sldId id="267"/>
+            <p14:sldId id="269"/>
+            <p14:sldId id="270"/>
           </p14:sldIdLst>
         </p14:section>
         <p14:section name="Sta je sledece?" id="{DEFC8AF4-3AAF-4249-AF23-22FE0D36F400}">
@@ -3912,6 +3922,195 @@
 </p:sld>
 </file>
 
+<file path=ppt/slides/slide10.xml><?xml version="1.0" encoding="utf-8"?>
+<p:sld xmlns:a="http://schemas.openxmlformats.org/drawingml/2006/main" xmlns:r="http://schemas.openxmlformats.org/officeDocument/2006/relationships" xmlns:p="http://schemas.openxmlformats.org/presentationml/2006/main">
+  <p:cSld>
+    <p:spTree>
+      <p:nvGrpSpPr>
+        <p:cNvPr id="1" name=""/>
+        <p:cNvGrpSpPr/>
+        <p:nvPr/>
+      </p:nvGrpSpPr>
+      <p:grpSpPr>
+        <a:xfrm>
+          <a:off x="0" y="0"/>
+          <a:ext cx="0" cy="0"/>
+          <a:chOff x="0" y="0"/>
+          <a:chExt cx="0" cy="0"/>
+        </a:xfrm>
+      </p:grpSpPr>
+      <p:sp>
+        <p:nvSpPr>
+          <p:cNvPr id="2" name="Title 1">
+            <a:extLst>
+              <a:ext uri="{FF2B5EF4-FFF2-40B4-BE49-F238E27FC236}">
+                <a16:creationId xmlns:a16="http://schemas.microsoft.com/office/drawing/2014/main" id="{94299182-22E5-7E09-9E2B-1B46B9C82288}"/>
+              </a:ext>
+            </a:extLst>
+          </p:cNvPr>
+          <p:cNvSpPr>
+            <a:spLocks noGrp="1"/>
+          </p:cNvSpPr>
+          <p:nvPr>
+            <p:ph type="title"/>
+          </p:nvPr>
+        </p:nvSpPr>
+        <p:spPr>
+          <a:xfrm>
+            <a:off x="420624" y="66186"/>
+            <a:ext cx="10543032" cy="1325563"/>
+          </a:xfrm>
+        </p:spPr>
+        <p:txBody>
+          <a:bodyPr>
+            <a:normAutofit fontScale="90000"/>
+          </a:bodyPr>
+          <a:lstStyle/>
+          <a:p>
+            <a:r>
+              <a:rPr lang="en-US"/>
+              <a:t>Bez histerezisa izmena otpornost (R1 i R0 = 8e-3 oma):</a:t>
+            </a:r>
+          </a:p>
+        </p:txBody>
+      </p:sp>
+      <p:pic>
+        <p:nvPicPr>
+          <p:cNvPr id="5" name="Content Placeholder 4">
+            <a:extLst>
+              <a:ext uri="{FF2B5EF4-FFF2-40B4-BE49-F238E27FC236}">
+                <a16:creationId xmlns:a16="http://schemas.microsoft.com/office/drawing/2014/main" id="{BA541F1B-16D4-958D-6C31-80B24101122E}"/>
+              </a:ext>
+            </a:extLst>
+          </p:cNvPr>
+          <p:cNvPicPr>
+            <a:picLocks noGrp="1" noChangeAspect="1"/>
+          </p:cNvPicPr>
+          <p:nvPr>
+            <p:ph idx="1"/>
+          </p:nvPr>
+        </p:nvPicPr>
+        <p:blipFill>
+          <a:blip r:embed="rId2"/>
+          <a:stretch>
+            <a:fillRect/>
+          </a:stretch>
+        </p:blipFill>
+        <p:spPr>
+          <a:xfrm>
+            <a:off x="1606394" y="1825625"/>
+            <a:ext cx="8171175" cy="4206875"/>
+          </a:xfrm>
+        </p:spPr>
+      </p:pic>
+    </p:spTree>
+    <p:extLst>
+      <p:ext uri="{BB962C8B-B14F-4D97-AF65-F5344CB8AC3E}">
+        <p14:creationId xmlns:p14="http://schemas.microsoft.com/office/powerpoint/2010/main" val="2530689530"/>
+      </p:ext>
+    </p:extLst>
+  </p:cSld>
+  <p:clrMapOvr>
+    <a:masterClrMapping/>
+  </p:clrMapOvr>
+</p:sld>
+</file>
+
+<file path=ppt/slides/slide11.xml><?xml version="1.0" encoding="utf-8"?>
+<p:sld xmlns:a="http://schemas.openxmlformats.org/drawingml/2006/main" xmlns:r="http://schemas.openxmlformats.org/officeDocument/2006/relationships" xmlns:p="http://schemas.openxmlformats.org/presentationml/2006/main">
+  <p:cSld>
+    <p:spTree>
+      <p:nvGrpSpPr>
+        <p:cNvPr id="1" name=""/>
+        <p:cNvGrpSpPr/>
+        <p:nvPr/>
+      </p:nvGrpSpPr>
+      <p:grpSpPr>
+        <a:xfrm>
+          <a:off x="0" y="0"/>
+          <a:ext cx="0" cy="0"/>
+          <a:chOff x="0" y="0"/>
+          <a:chExt cx="0" cy="0"/>
+        </a:xfrm>
+      </p:grpSpPr>
+      <p:sp>
+        <p:nvSpPr>
+          <p:cNvPr id="2" name="Title 1">
+            <a:extLst>
+              <a:ext uri="{FF2B5EF4-FFF2-40B4-BE49-F238E27FC236}">
+                <a16:creationId xmlns:a16="http://schemas.microsoft.com/office/drawing/2014/main" id="{F850A91F-2E00-4811-FCB4-E38A68D21F06}"/>
+              </a:ext>
+            </a:extLst>
+          </p:cNvPr>
+          <p:cNvSpPr>
+            <a:spLocks noGrp="1"/>
+          </p:cNvSpPr>
+          <p:nvPr>
+            <p:ph type="title"/>
+          </p:nvPr>
+        </p:nvSpPr>
+        <p:spPr/>
+        <p:txBody>
+          <a:bodyPr/>
+          <a:lstStyle/>
+          <a:p>
+            <a:endParaRPr lang="en-US"/>
+          </a:p>
+        </p:txBody>
+      </p:sp>
+      <p:sp>
+        <p:nvSpPr>
+          <p:cNvPr id="3" name="Content Placeholder 2">
+            <a:extLst>
+              <a:ext uri="{FF2B5EF4-FFF2-40B4-BE49-F238E27FC236}">
+                <a16:creationId xmlns:a16="http://schemas.microsoft.com/office/drawing/2014/main" id="{67B724EE-2B20-A4A9-844C-B2EAC60C9DEC}"/>
+              </a:ext>
+            </a:extLst>
+          </p:cNvPr>
+          <p:cNvSpPr>
+            <a:spLocks noGrp="1"/>
+          </p:cNvSpPr>
+          <p:nvPr>
+            <p:ph idx="1"/>
+          </p:nvPr>
+        </p:nvSpPr>
+        <p:spPr/>
+        <p:txBody>
+          <a:bodyPr/>
+          <a:lstStyle/>
+          <a:p>
+            <a:r>
+              <a:rPr lang="en-US"/>
+              <a:t>Veci broj polova ce maksimalno popraviti rezultate</a:t>
+            </a:r>
+          </a:p>
+          <a:p>
+            <a:r>
+              <a:rPr lang="en-US"/>
+              <a:t>Inicijalni pokusaj za algoritam pomaze rezultate</a:t>
+            </a:r>
+          </a:p>
+          <a:p>
+            <a:r>
+              <a:rPr lang="en-US"/>
+              <a:t>Tacke 5,6,7..</a:t>
+            </a:r>
+          </a:p>
+        </p:txBody>
+      </p:sp>
+    </p:spTree>
+    <p:extLst>
+      <p:ext uri="{BB962C8B-B14F-4D97-AF65-F5344CB8AC3E}">
+        <p14:creationId xmlns:p14="http://schemas.microsoft.com/office/powerpoint/2010/main" val="1936536138"/>
+      </p:ext>
+    </p:extLst>
+  </p:cSld>
+  <p:clrMapOvr>
+    <a:masterClrMapping/>
+  </p:clrMapOvr>
+</p:sld>
+</file>
+
 <file path=ppt/slides/slide2.xml><?xml version="1.0" encoding="utf-8"?>
 <p:sld xmlns:a="http://schemas.openxmlformats.org/drawingml/2006/main" xmlns:r="http://schemas.openxmlformats.org/officeDocument/2006/relationships" xmlns:p="http://schemas.openxmlformats.org/presentationml/2006/main">
   <p:cSld>
@@ -4199,7 +4398,7 @@
                   </a:schemeClr>
                 </a:solidFill>
               </a:rPr>
-              <a:t>5. Prebaciti schematic model iz VHIL-a u PHIL</a:t>
+              <a:t>5. Prebaciti schematic model iz VHIL-a u PHIL (1h)</a:t>
             </a:r>
           </a:p>
           <a:p>
@@ -4368,53 +4567,58 @@
             <p:ph type="title"/>
           </p:nvPr>
         </p:nvSpPr>
-        <p:spPr/>
-        <p:txBody>
-          <a:bodyPr/>
+        <p:spPr>
+          <a:xfrm>
+            <a:off x="420624" y="66186"/>
+            <a:ext cx="10543032" cy="1325563"/>
+          </a:xfrm>
+        </p:spPr>
+        <p:txBody>
+          <a:bodyPr>
+            <a:normAutofit fontScale="90000"/>
+          </a:bodyPr>
           <a:lstStyle/>
           <a:p>
-            <a:endParaRPr lang="en-US"/>
-          </a:p>
-        </p:txBody>
-      </p:sp>
-      <p:sp>
-        <p:nvSpPr>
-          <p:cNvPr id="3" name="Content Placeholder 2">
-            <a:extLst>
-              <a:ext uri="{FF2B5EF4-FFF2-40B4-BE49-F238E27FC236}">
-                <a16:creationId xmlns:a16="http://schemas.microsoft.com/office/drawing/2014/main" id="{7A6D5AC8-3993-BA10-C1A1-24768DA73966}"/>
-              </a:ext>
-            </a:extLst>
-          </p:cNvPr>
-          <p:cNvSpPr>
-            <a:spLocks noGrp="1"/>
-          </p:cNvSpPr>
+            <a:r>
+              <a:rPr lang="en-US"/>
+              <a:t>Bez histerezisa (Dobar inicijalni pokusaj):</a:t>
+            </a:r>
+          </a:p>
+        </p:txBody>
+      </p:sp>
+      <p:pic>
+        <p:nvPicPr>
+          <p:cNvPr id="11" name="Content Placeholder 10">
+            <a:extLst>
+              <a:ext uri="{FF2B5EF4-FFF2-40B4-BE49-F238E27FC236}">
+                <a16:creationId xmlns:a16="http://schemas.microsoft.com/office/drawing/2014/main" id="{2ABA69DC-C5FC-4755-C51A-FA4AB5F328CF}"/>
+              </a:ext>
+            </a:extLst>
+          </p:cNvPr>
+          <p:cNvPicPr>
+            <a:picLocks noGrp="1" noChangeAspect="1"/>
+          </p:cNvPicPr>
           <p:nvPr>
             <p:ph idx="1"/>
           </p:nvPr>
-        </p:nvSpPr>
-        <p:spPr/>
-        <p:txBody>
-          <a:bodyPr/>
-          <a:lstStyle/>
-          <a:p>
-            <a:r>
-              <a:rPr lang="en-US"/>
-              <a:t>Rezultati za default parametre za sve algoritme</a:t>
-            </a:r>
-          </a:p>
-          <a:p>
-            <a:r>
-              <a:rPr lang="en-US"/>
-              <a:t>Rezultati za jos 2 seta parametara</a:t>
-            </a:r>
-          </a:p>
-        </p:txBody>
-      </p:sp>
+        </p:nvPicPr>
+        <p:blipFill>
+          <a:blip r:embed="rId2"/>
+          <a:stretch>
+            <a:fillRect/>
+          </a:stretch>
+        </p:blipFill>
+        <p:spPr>
+          <a:xfrm>
+            <a:off x="1597111" y="1825625"/>
+            <a:ext cx="8189741" cy="4206875"/>
+          </a:xfrm>
+        </p:spPr>
+      </p:pic>
     </p:spTree>
     <p:extLst>
       <p:ext uri="{BB962C8B-B14F-4D97-AF65-F5344CB8AC3E}">
-        <p14:creationId xmlns:p14="http://schemas.microsoft.com/office/powerpoint/2010/main" val="3291260613"/>
+        <p14:creationId xmlns:p14="http://schemas.microsoft.com/office/powerpoint/2010/main" val="673460244"/>
       </p:ext>
     </p:extLst>
   </p:cSld>
@@ -4446,7 +4650,7 @@
           <p:cNvPr id="2" name="Title 1">
             <a:extLst>
               <a:ext uri="{FF2B5EF4-FFF2-40B4-BE49-F238E27FC236}">
-                <a16:creationId xmlns:a16="http://schemas.microsoft.com/office/drawing/2014/main" id="{F850A91F-2E00-4811-FCB4-E38A68D21F06}"/>
+                <a16:creationId xmlns:a16="http://schemas.microsoft.com/office/drawing/2014/main" id="{94299182-22E5-7E09-9E2B-1B46B9C82288}"/>
               </a:ext>
             </a:extLst>
           </p:cNvPr>
@@ -4457,81 +4661,336 @@
             <p:ph type="title"/>
           </p:nvPr>
         </p:nvSpPr>
-        <p:spPr/>
+        <p:spPr>
+          <a:xfrm>
+            <a:off x="420624" y="66186"/>
+            <a:ext cx="10543032" cy="1325563"/>
+          </a:xfrm>
+        </p:spPr>
         <p:txBody>
           <a:bodyPr/>
           <a:lstStyle/>
           <a:p>
-            <a:endParaRPr lang="en-US"/>
-          </a:p>
-        </p:txBody>
-      </p:sp>
-      <p:sp>
-        <p:nvSpPr>
-          <p:cNvPr id="3" name="Content Placeholder 2">
-            <a:extLst>
-              <a:ext uri="{FF2B5EF4-FFF2-40B4-BE49-F238E27FC236}">
-                <a16:creationId xmlns:a16="http://schemas.microsoft.com/office/drawing/2014/main" id="{67B724EE-2B20-A4A9-844C-B2EAC60C9DEC}"/>
-              </a:ext>
-            </a:extLst>
-          </p:cNvPr>
-          <p:cNvSpPr>
-            <a:spLocks noGrp="1"/>
-          </p:cNvSpPr>
+            <a:r>
+              <a:rPr lang="en-US"/>
+              <a:t>Bez histerezisa:</a:t>
+            </a:r>
+          </a:p>
+        </p:txBody>
+      </p:sp>
+      <p:pic>
+        <p:nvPicPr>
+          <p:cNvPr id="11" name="Content Placeholder 10">
+            <a:extLst>
+              <a:ext uri="{FF2B5EF4-FFF2-40B4-BE49-F238E27FC236}">
+                <a16:creationId xmlns:a16="http://schemas.microsoft.com/office/drawing/2014/main" id="{97E2B55F-250E-5FCA-296C-35FB0E36432A}"/>
+              </a:ext>
+            </a:extLst>
+          </p:cNvPr>
+          <p:cNvPicPr>
+            <a:picLocks noGrp="1" noChangeAspect="1"/>
+          </p:cNvPicPr>
           <p:nvPr>
             <p:ph idx="1"/>
           </p:nvPr>
-        </p:nvSpPr>
-        <p:spPr/>
-        <p:txBody>
-          <a:bodyPr/>
-          <a:lstStyle/>
-          <a:p>
-            <a:r>
-              <a:rPr lang="en-US"/>
-              <a:t>Sta sam ja naucio</a:t>
-            </a:r>
-          </a:p>
-          <a:p>
-            <a:pPr lvl="1"/>
-            <a:r>
-              <a:rPr lang="en-US"/>
-              <a:t>Git </a:t>
-            </a:r>
-          </a:p>
-          <a:p>
-            <a:pPr lvl="1"/>
-            <a:r>
-              <a:rPr lang="en-US"/>
-              <a:t>Data Science i python</a:t>
-            </a:r>
-          </a:p>
-          <a:p>
-            <a:pPr lvl="1"/>
-            <a:r>
-              <a:rPr lang="en-US"/>
-              <a:t>Baterije</a:t>
-            </a:r>
-          </a:p>
-          <a:p>
-            <a:pPr lvl="1"/>
-            <a:r>
-              <a:rPr lang="en-US"/>
-              <a:t>Otkrivanje bugova u Tajfunu</a:t>
-            </a:r>
-          </a:p>
-          <a:p>
-            <a:r>
-              <a:rPr lang="en-US"/>
-              <a:t>Sta raditi sa ovim projektom?</a:t>
-            </a:r>
-          </a:p>
-        </p:txBody>
-      </p:sp>
+        </p:nvPicPr>
+        <p:blipFill>
+          <a:blip r:embed="rId2"/>
+          <a:stretch>
+            <a:fillRect/>
+          </a:stretch>
+        </p:blipFill>
+        <p:spPr>
+          <a:xfrm>
+            <a:off x="1536078" y="1825625"/>
+            <a:ext cx="8311806" cy="4206875"/>
+          </a:xfrm>
+        </p:spPr>
+      </p:pic>
     </p:spTree>
     <p:extLst>
       <p:ext uri="{BB962C8B-B14F-4D97-AF65-F5344CB8AC3E}">
-        <p14:creationId xmlns:p14="http://schemas.microsoft.com/office/powerpoint/2010/main" val="1936536138"/>
+        <p14:creationId xmlns:p14="http://schemas.microsoft.com/office/powerpoint/2010/main" val="2911602323"/>
+      </p:ext>
+    </p:extLst>
+  </p:cSld>
+  <p:clrMapOvr>
+    <a:masterClrMapping/>
+  </p:clrMapOvr>
+</p:sld>
+</file>
+
+<file path=ppt/slides/slide7.xml><?xml version="1.0" encoding="utf-8"?>
+<p:sld xmlns:a="http://schemas.openxmlformats.org/drawingml/2006/main" xmlns:r="http://schemas.openxmlformats.org/officeDocument/2006/relationships" xmlns:p="http://schemas.openxmlformats.org/presentationml/2006/main">
+  <p:cSld>
+    <p:spTree>
+      <p:nvGrpSpPr>
+        <p:cNvPr id="1" name=""/>
+        <p:cNvGrpSpPr/>
+        <p:nvPr/>
+      </p:nvGrpSpPr>
+      <p:grpSpPr>
+        <a:xfrm>
+          <a:off x="0" y="0"/>
+          <a:ext cx="0" cy="0"/>
+          <a:chOff x="0" y="0"/>
+          <a:chExt cx="0" cy="0"/>
+        </a:xfrm>
+      </p:grpSpPr>
+      <p:sp>
+        <p:nvSpPr>
+          <p:cNvPr id="2" name="Title 1">
+            <a:extLst>
+              <a:ext uri="{FF2B5EF4-FFF2-40B4-BE49-F238E27FC236}">
+                <a16:creationId xmlns:a16="http://schemas.microsoft.com/office/drawing/2014/main" id="{94299182-22E5-7E09-9E2B-1B46B9C82288}"/>
+              </a:ext>
+            </a:extLst>
+          </p:cNvPr>
+          <p:cNvSpPr>
+            <a:spLocks noGrp="1"/>
+          </p:cNvSpPr>
+          <p:nvPr>
+            <p:ph type="title"/>
+          </p:nvPr>
+        </p:nvSpPr>
+        <p:spPr>
+          <a:xfrm>
+            <a:off x="420624" y="66186"/>
+            <a:ext cx="10543032" cy="1325563"/>
+          </a:xfrm>
+        </p:spPr>
+        <p:txBody>
+          <a:bodyPr/>
+          <a:lstStyle/>
+          <a:p>
+            <a:r>
+              <a:rPr lang="en-US"/>
+              <a:t>Sa histerezisom:</a:t>
+            </a:r>
+          </a:p>
+        </p:txBody>
+      </p:sp>
+      <p:pic>
+        <p:nvPicPr>
+          <p:cNvPr id="9" name="Content Placeholder 8">
+            <a:extLst>
+              <a:ext uri="{FF2B5EF4-FFF2-40B4-BE49-F238E27FC236}">
+                <a16:creationId xmlns:a16="http://schemas.microsoft.com/office/drawing/2014/main" id="{5568F0FB-1224-2DC4-6137-691EB6CBF541}"/>
+              </a:ext>
+            </a:extLst>
+          </p:cNvPr>
+          <p:cNvPicPr>
+            <a:picLocks noGrp="1" noChangeAspect="1"/>
+          </p:cNvPicPr>
+          <p:nvPr>
+            <p:ph idx="1"/>
+          </p:nvPr>
+        </p:nvPicPr>
+        <p:blipFill>
+          <a:blip r:embed="rId2"/>
+          <a:stretch>
+            <a:fillRect/>
+          </a:stretch>
+        </p:blipFill>
+        <p:spPr>
+          <a:xfrm>
+            <a:off x="420624" y="1097004"/>
+            <a:ext cx="11350752" cy="5594919"/>
+          </a:xfrm>
+        </p:spPr>
+      </p:pic>
+    </p:spTree>
+    <p:extLst>
+      <p:ext uri="{BB962C8B-B14F-4D97-AF65-F5344CB8AC3E}">
+        <p14:creationId xmlns:p14="http://schemas.microsoft.com/office/powerpoint/2010/main" val="230922219"/>
+      </p:ext>
+    </p:extLst>
+  </p:cSld>
+  <p:clrMapOvr>
+    <a:masterClrMapping/>
+  </p:clrMapOvr>
+</p:sld>
+</file>
+
+<file path=ppt/slides/slide8.xml><?xml version="1.0" encoding="utf-8"?>
+<p:sld xmlns:a="http://schemas.openxmlformats.org/drawingml/2006/main" xmlns:r="http://schemas.openxmlformats.org/officeDocument/2006/relationships" xmlns:p="http://schemas.openxmlformats.org/presentationml/2006/main">
+  <p:cSld>
+    <p:spTree>
+      <p:nvGrpSpPr>
+        <p:cNvPr id="1" name=""/>
+        <p:cNvGrpSpPr/>
+        <p:nvPr/>
+      </p:nvGrpSpPr>
+      <p:grpSpPr>
+        <a:xfrm>
+          <a:off x="0" y="0"/>
+          <a:ext cx="0" cy="0"/>
+          <a:chOff x="0" y="0"/>
+          <a:chExt cx="0" cy="0"/>
+        </a:xfrm>
+      </p:grpSpPr>
+      <p:sp>
+        <p:nvSpPr>
+          <p:cNvPr id="2" name="Title 1">
+            <a:extLst>
+              <a:ext uri="{FF2B5EF4-FFF2-40B4-BE49-F238E27FC236}">
+                <a16:creationId xmlns:a16="http://schemas.microsoft.com/office/drawing/2014/main" id="{94299182-22E5-7E09-9E2B-1B46B9C82288}"/>
+              </a:ext>
+            </a:extLst>
+          </p:cNvPr>
+          <p:cNvSpPr>
+            <a:spLocks noGrp="1"/>
+          </p:cNvSpPr>
+          <p:nvPr>
+            <p:ph type="title"/>
+          </p:nvPr>
+        </p:nvSpPr>
+        <p:spPr>
+          <a:xfrm>
+            <a:off x="420624" y="66186"/>
+            <a:ext cx="10543032" cy="1325563"/>
+          </a:xfrm>
+        </p:spPr>
+        <p:txBody>
+          <a:bodyPr>
+            <a:normAutofit fontScale="90000"/>
+          </a:bodyPr>
+          <a:lstStyle/>
+          <a:p>
+            <a:r>
+              <a:rPr lang="en-US"/>
+              <a:t>Sa histerezisom (double_minimize, triple_minimize, differential evolution):</a:t>
+            </a:r>
+          </a:p>
+        </p:txBody>
+      </p:sp>
+      <p:pic>
+        <p:nvPicPr>
+          <p:cNvPr id="6" name="Content Placeholder 5">
+            <a:extLst>
+              <a:ext uri="{FF2B5EF4-FFF2-40B4-BE49-F238E27FC236}">
+                <a16:creationId xmlns:a16="http://schemas.microsoft.com/office/drawing/2014/main" id="{95ABC527-1641-F5E0-6CD1-E2DA478502F6}"/>
+              </a:ext>
+            </a:extLst>
+          </p:cNvPr>
+          <p:cNvPicPr>
+            <a:picLocks noGrp="1" noChangeAspect="1"/>
+          </p:cNvPicPr>
+          <p:nvPr>
+            <p:ph idx="1"/>
+          </p:nvPr>
+        </p:nvPicPr>
+        <p:blipFill>
+          <a:blip r:embed="rId2"/>
+          <a:stretch>
+            <a:fillRect/>
+          </a:stretch>
+        </p:blipFill>
+        <p:spPr>
+          <a:xfrm>
+            <a:off x="508548" y="1391749"/>
+            <a:ext cx="11262828" cy="5155433"/>
+          </a:xfrm>
+        </p:spPr>
+      </p:pic>
+    </p:spTree>
+    <p:extLst>
+      <p:ext uri="{BB962C8B-B14F-4D97-AF65-F5344CB8AC3E}">
+        <p14:creationId xmlns:p14="http://schemas.microsoft.com/office/powerpoint/2010/main" val="2232099940"/>
+      </p:ext>
+    </p:extLst>
+  </p:cSld>
+  <p:clrMapOvr>
+    <a:masterClrMapping/>
+  </p:clrMapOvr>
+</p:sld>
+</file>
+
+<file path=ppt/slides/slide9.xml><?xml version="1.0" encoding="utf-8"?>
+<p:sld xmlns:a="http://schemas.openxmlformats.org/drawingml/2006/main" xmlns:r="http://schemas.openxmlformats.org/officeDocument/2006/relationships" xmlns:p="http://schemas.openxmlformats.org/presentationml/2006/main">
+  <p:cSld>
+    <p:spTree>
+      <p:nvGrpSpPr>
+        <p:cNvPr id="1" name=""/>
+        <p:cNvGrpSpPr/>
+        <p:nvPr/>
+      </p:nvGrpSpPr>
+      <p:grpSpPr>
+        <a:xfrm>
+          <a:off x="0" y="0"/>
+          <a:ext cx="0" cy="0"/>
+          <a:chOff x="0" y="0"/>
+          <a:chExt cx="0" cy="0"/>
+        </a:xfrm>
+      </p:grpSpPr>
+      <p:sp>
+        <p:nvSpPr>
+          <p:cNvPr id="2" name="Title 1">
+            <a:extLst>
+              <a:ext uri="{FF2B5EF4-FFF2-40B4-BE49-F238E27FC236}">
+                <a16:creationId xmlns:a16="http://schemas.microsoft.com/office/drawing/2014/main" id="{94299182-22E5-7E09-9E2B-1B46B9C82288}"/>
+              </a:ext>
+            </a:extLst>
+          </p:cNvPr>
+          <p:cNvSpPr>
+            <a:spLocks noGrp="1"/>
+          </p:cNvSpPr>
+          <p:nvPr>
+            <p:ph type="title"/>
+          </p:nvPr>
+        </p:nvSpPr>
+        <p:spPr>
+          <a:xfrm>
+            <a:off x="420624" y="66186"/>
+            <a:ext cx="10543032" cy="1325563"/>
+          </a:xfrm>
+        </p:spPr>
+        <p:txBody>
+          <a:bodyPr>
+            <a:normAutofit fontScale="90000"/>
+          </a:bodyPr>
+          <a:lstStyle/>
+          <a:p>
+            <a:r>
+              <a:rPr lang="en-US"/>
+              <a:t>Sa histerezisom izmena otpornost (R1 i R0 = 8e-3 oma):</a:t>
+            </a:r>
+          </a:p>
+        </p:txBody>
+      </p:sp>
+      <p:pic>
+        <p:nvPicPr>
+          <p:cNvPr id="5" name="Content Placeholder 4">
+            <a:extLst>
+              <a:ext uri="{FF2B5EF4-FFF2-40B4-BE49-F238E27FC236}">
+                <a16:creationId xmlns:a16="http://schemas.microsoft.com/office/drawing/2014/main" id="{8BB5C4B5-0D6C-BADA-F4DD-3390355E12D0}"/>
+              </a:ext>
+            </a:extLst>
+          </p:cNvPr>
+          <p:cNvPicPr>
+            <a:picLocks noGrp="1" noChangeAspect="1"/>
+          </p:cNvPicPr>
+          <p:nvPr>
+            <p:ph idx="1"/>
+          </p:nvPr>
+        </p:nvPicPr>
+        <p:blipFill>
+          <a:blip r:embed="rId2"/>
+          <a:stretch>
+            <a:fillRect/>
+          </a:stretch>
+        </p:blipFill>
+        <p:spPr>
+          <a:xfrm>
+            <a:off x="1456053" y="1825625"/>
+            <a:ext cx="8471856" cy="4206875"/>
+          </a:xfrm>
+        </p:spPr>
+      </p:pic>
+    </p:spTree>
+    <p:extLst>
+      <p:ext uri="{BB962C8B-B14F-4D97-AF65-F5344CB8AC3E}">
+        <p14:creationId xmlns:p14="http://schemas.microsoft.com/office/powerpoint/2010/main" val="2747697786"/>
       </p:ext>
     </p:extLst>
   </p:cSld>

</xml_diff>